<commit_message>
minor tweaks to presentation
</commit_message>
<xml_diff>
--- a/opentable_analysis_presentation.pptx
+++ b/opentable_analysis_presentation.pptx
@@ -11,20 +11,20 @@
     <p:sldId id="278" r:id="rId5"/>
     <p:sldId id="259" r:id="rId6"/>
     <p:sldId id="273" r:id="rId7"/>
-    <p:sldId id="277" r:id="rId8"/>
-    <p:sldId id="276" r:id="rId9"/>
+    <p:sldId id="276" r:id="rId8"/>
+    <p:sldId id="277" r:id="rId9"/>
     <p:sldId id="282" r:id="rId10"/>
     <p:sldId id="281" r:id="rId11"/>
     <p:sldId id="280" r:id="rId12"/>
     <p:sldId id="279" r:id="rId13"/>
-    <p:sldId id="286" r:id="rId14"/>
-    <p:sldId id="285" r:id="rId15"/>
-    <p:sldId id="284" r:id="rId16"/>
-    <p:sldId id="283" r:id="rId17"/>
-    <p:sldId id="287" r:id="rId18"/>
-    <p:sldId id="290" r:id="rId19"/>
-    <p:sldId id="288" r:id="rId20"/>
-    <p:sldId id="289" r:id="rId21"/>
+    <p:sldId id="285" r:id="rId14"/>
+    <p:sldId id="284" r:id="rId15"/>
+    <p:sldId id="283" r:id="rId16"/>
+    <p:sldId id="287" r:id="rId17"/>
+    <p:sldId id="290" r:id="rId18"/>
+    <p:sldId id="288" r:id="rId19"/>
+    <p:sldId id="289" r:id="rId20"/>
+    <p:sldId id="293" r:id="rId21"/>
     <p:sldId id="292" r:id="rId22"/>
     <p:sldId id="291" r:id="rId23"/>
   </p:sldIdLst>
@@ -280,7 +280,7 @@
           <a:p>
             <a:fld id="{1A89D941-2EEA-4CEB-AB6F-6B4FD8BA4988}" type="datetimeFigureOut">
               <a:rPr lang="en-US" smtClean="0"/>
-              <a:t>7/25/2021</a:t>
+              <a:t>7/26/2021</a:t>
             </a:fld>
             <a:endParaRPr lang="en-US"/>
           </a:p>
@@ -478,7 +478,7 @@
           <a:p>
             <a:fld id="{1A89D941-2EEA-4CEB-AB6F-6B4FD8BA4988}" type="datetimeFigureOut">
               <a:rPr lang="en-US" smtClean="0"/>
-              <a:t>7/25/2021</a:t>
+              <a:t>7/26/2021</a:t>
             </a:fld>
             <a:endParaRPr lang="en-US"/>
           </a:p>
@@ -686,7 +686,7 @@
           <a:p>
             <a:fld id="{1A89D941-2EEA-4CEB-AB6F-6B4FD8BA4988}" type="datetimeFigureOut">
               <a:rPr lang="en-US" smtClean="0"/>
-              <a:t>7/25/2021</a:t>
+              <a:t>7/26/2021</a:t>
             </a:fld>
             <a:endParaRPr lang="en-US"/>
           </a:p>
@@ -884,7 +884,7 @@
           <a:p>
             <a:fld id="{1A89D941-2EEA-4CEB-AB6F-6B4FD8BA4988}" type="datetimeFigureOut">
               <a:rPr lang="en-US" smtClean="0"/>
-              <a:t>7/25/2021</a:t>
+              <a:t>7/26/2021</a:t>
             </a:fld>
             <a:endParaRPr lang="en-US"/>
           </a:p>
@@ -1159,7 +1159,7 @@
           <a:p>
             <a:fld id="{1A89D941-2EEA-4CEB-AB6F-6B4FD8BA4988}" type="datetimeFigureOut">
               <a:rPr lang="en-US" smtClean="0"/>
-              <a:t>7/25/2021</a:t>
+              <a:t>7/26/2021</a:t>
             </a:fld>
             <a:endParaRPr lang="en-US"/>
           </a:p>
@@ -1424,7 +1424,7 @@
           <a:p>
             <a:fld id="{1A89D941-2EEA-4CEB-AB6F-6B4FD8BA4988}" type="datetimeFigureOut">
               <a:rPr lang="en-US" smtClean="0"/>
-              <a:t>7/25/2021</a:t>
+              <a:t>7/26/2021</a:t>
             </a:fld>
             <a:endParaRPr lang="en-US"/>
           </a:p>
@@ -1836,7 +1836,7 @@
           <a:p>
             <a:fld id="{1A89D941-2EEA-4CEB-AB6F-6B4FD8BA4988}" type="datetimeFigureOut">
               <a:rPr lang="en-US" smtClean="0"/>
-              <a:t>7/25/2021</a:t>
+              <a:t>7/26/2021</a:t>
             </a:fld>
             <a:endParaRPr lang="en-US"/>
           </a:p>
@@ -1977,7 +1977,7 @@
           <a:p>
             <a:fld id="{1A89D941-2EEA-4CEB-AB6F-6B4FD8BA4988}" type="datetimeFigureOut">
               <a:rPr lang="en-US" smtClean="0"/>
-              <a:t>7/25/2021</a:t>
+              <a:t>7/26/2021</a:t>
             </a:fld>
             <a:endParaRPr lang="en-US"/>
           </a:p>
@@ -2090,7 +2090,7 @@
           <a:p>
             <a:fld id="{1A89D941-2EEA-4CEB-AB6F-6B4FD8BA4988}" type="datetimeFigureOut">
               <a:rPr lang="en-US" smtClean="0"/>
-              <a:t>7/25/2021</a:t>
+              <a:t>7/26/2021</a:t>
             </a:fld>
             <a:endParaRPr lang="en-US"/>
           </a:p>
@@ -2401,7 +2401,7 @@
           <a:p>
             <a:fld id="{1A89D941-2EEA-4CEB-AB6F-6B4FD8BA4988}" type="datetimeFigureOut">
               <a:rPr lang="en-US" smtClean="0"/>
-              <a:t>7/25/2021</a:t>
+              <a:t>7/26/2021</a:t>
             </a:fld>
             <a:endParaRPr lang="en-US"/>
           </a:p>
@@ -2689,7 +2689,7 @@
           <a:p>
             <a:fld id="{1A89D941-2EEA-4CEB-AB6F-6B4FD8BA4988}" type="datetimeFigureOut">
               <a:rPr lang="en-US" smtClean="0"/>
-              <a:t>7/25/2021</a:t>
+              <a:t>7/26/2021</a:t>
             </a:fld>
             <a:endParaRPr lang="en-US"/>
           </a:p>
@@ -2930,7 +2930,7 @@
           <a:p>
             <a:fld id="{1A89D941-2EEA-4CEB-AB6F-6B4FD8BA4988}" type="datetimeFigureOut">
               <a:rPr lang="en-US" smtClean="0"/>
-              <a:t>7/25/2021</a:t>
+              <a:t>7/26/2021</a:t>
             </a:fld>
             <a:endParaRPr lang="en-US"/>
           </a:p>
@@ -4600,7 +4600,7 @@
                 <a:ea typeface="+mj-ea"/>
                 <a:cs typeface="+mj-cs"/>
               </a:rPr>
-              <a:t>the be-all and end-all?</a:t>
+              <a:t>the be-all, end-all?</a:t>
             </a:r>
           </a:p>
         </p:txBody>
@@ -5141,8 +5141,8 @@
         </p:nvSpPr>
         <p:spPr>
           <a:xfrm>
-            <a:off x="1161565" y="261819"/>
-            <a:ext cx="9863573" cy="1325563"/>
+            <a:off x="7352522" y="261818"/>
+            <a:ext cx="4749282" cy="6297601"/>
           </a:xfrm>
         </p:spPr>
         <p:txBody>
@@ -5152,12 +5152,62 @@
           <a:lstStyle/>
           <a:p>
             <a:r>
-              <a:rPr lang="en-US" sz="4000" dirty="0">
+              <a:rPr lang="en-US" sz="2400" dirty="0">
                 <a:solidFill>
                   <a:srgbClr val="FFFFFF"/>
                 </a:solidFill>
               </a:rPr>
-              <a:t>Nearly 100% of NYC restaurants on OpenTable have 4-star or better ratings in every category</a:t>
+              <a:t>Nearly 100% of NYC restaurants on OpenTable have 4-stars or better in every individual category and overall</a:t>
+            </a:r>
+            <a:br>
+              <a:rPr lang="en-US" sz="2400" dirty="0">
+                <a:solidFill>
+                  <a:srgbClr val="FFFFFF"/>
+                </a:solidFill>
+              </a:rPr>
+            </a:br>
+            <a:br>
+              <a:rPr lang="en-US" sz="2400" dirty="0">
+                <a:solidFill>
+                  <a:srgbClr val="FFFFFF"/>
+                </a:solidFill>
+              </a:rPr>
+            </a:br>
+            <a:br>
+              <a:rPr lang="en-US" sz="2400" dirty="0">
+                <a:solidFill>
+                  <a:srgbClr val="FFFFFF"/>
+                </a:solidFill>
+              </a:rPr>
+            </a:br>
+            <a:br>
+              <a:rPr lang="en-US" sz="2400" dirty="0">
+                <a:solidFill>
+                  <a:srgbClr val="FFFFFF"/>
+                </a:solidFill>
+              </a:rPr>
+            </a:br>
+            <a:br>
+              <a:rPr lang="en-US" sz="2400" dirty="0">
+                <a:solidFill>
+                  <a:srgbClr val="FFFFFF"/>
+                </a:solidFill>
+              </a:rPr>
+            </a:br>
+            <a:br>
+              <a:rPr lang="en-US" sz="2400" dirty="0">
+                <a:solidFill>
+                  <a:srgbClr val="FFFFFF"/>
+                </a:solidFill>
+              </a:rPr>
+            </a:br>
+            <a:r>
+              <a:rPr lang="en-US" sz="2400" dirty="0">
+                <a:solidFill>
+                  <a:srgbClr val="FFFFFF"/>
+                </a:solidFill>
+              </a:rPr>
+              <a:t>Recommendations follow a very similar distribution clustered around 80-100% recommended</a:t>
             </a:r>
           </a:p>
         </p:txBody>
@@ -5184,8 +5234,38 @@
         </p:blipFill>
         <p:spPr>
           <a:xfrm>
-            <a:off x="1250729" y="1690688"/>
-            <a:ext cx="9685247" cy="4690672"/>
+            <a:off x="-1" y="-7186"/>
+            <a:ext cx="6946645" cy="3364337"/>
+          </a:xfrm>
+          <a:prstGeom prst="rect">
+            <a:avLst/>
+          </a:prstGeom>
+        </p:spPr>
+      </p:pic>
+      <p:pic>
+        <p:nvPicPr>
+          <p:cNvPr id="7" name="Picture 6">
+            <a:extLst>
+              <a:ext uri="{FF2B5EF4-FFF2-40B4-BE49-F238E27FC236}">
+                <a16:creationId xmlns:a16="http://schemas.microsoft.com/office/drawing/2014/main" id="{58A67932-A533-4D94-9F12-82D55FBE256D}"/>
+              </a:ext>
+            </a:extLst>
+          </p:cNvPr>
+          <p:cNvPicPr>
+            <a:picLocks noChangeAspect="1"/>
+          </p:cNvPicPr>
+          <p:nvPr/>
+        </p:nvPicPr>
+        <p:blipFill>
+          <a:blip r:embed="rId3"/>
+          <a:stretch>
+            <a:fillRect/>
+          </a:stretch>
+        </p:blipFill>
+        <p:spPr>
+          <a:xfrm>
+            <a:off x="0" y="3357151"/>
+            <a:ext cx="6946644" cy="3500849"/>
           </a:xfrm>
           <a:prstGeom prst="rect">
             <a:avLst/>
@@ -5513,10 +5593,10 @@
       </p:sp>
       <p:sp>
         <p:nvSpPr>
-          <p:cNvPr id="3" name="Content Placeholder 2">
-            <a:extLst>
-              <a:ext uri="{FF2B5EF4-FFF2-40B4-BE49-F238E27FC236}">
-                <a16:creationId xmlns:a16="http://schemas.microsoft.com/office/drawing/2014/main" id="{14AA2F97-C180-483E-9001-6A094FDC2985}"/>
+          <p:cNvPr id="2" name="Title 1">
+            <a:extLst>
+              <a:ext uri="{FF2B5EF4-FFF2-40B4-BE49-F238E27FC236}">
+                <a16:creationId xmlns:a16="http://schemas.microsoft.com/office/drawing/2014/main" id="{F775F40A-BC61-453D-97EA-0314301A5978}"/>
               </a:ext>
             </a:extLst>
           </p:cNvPr>
@@ -5524,66 +5604,140 @@
             <a:spLocks noGrp="1"/>
           </p:cNvSpPr>
           <p:nvPr>
-            <p:ph idx="1"/>
+            <p:ph type="title"/>
           </p:nvPr>
         </p:nvSpPr>
         <p:spPr>
           <a:xfrm>
-            <a:off x="1790700" y="5851036"/>
-            <a:ext cx="8820150" cy="547077"/>
+            <a:off x="833002" y="365125"/>
+            <a:ext cx="10520702" cy="1325563"/>
           </a:xfrm>
         </p:spPr>
         <p:txBody>
           <a:bodyPr>
-            <a:noAutofit/>
+            <a:normAutofit/>
           </a:bodyPr>
           <a:lstStyle/>
           <a:p>
+            <a:r>
+              <a:rPr lang="en-US" dirty="0">
+                <a:solidFill>
+                  <a:srgbClr val="FFFFFF"/>
+                </a:solidFill>
+              </a:rPr>
+              <a:t>Explanations:</a:t>
+            </a:r>
+          </a:p>
+        </p:txBody>
+      </p:sp>
+      <p:sp>
+        <p:nvSpPr>
+          <p:cNvPr id="3" name="Content Placeholder 2">
+            <a:extLst>
+              <a:ext uri="{FF2B5EF4-FFF2-40B4-BE49-F238E27FC236}">
+                <a16:creationId xmlns:a16="http://schemas.microsoft.com/office/drawing/2014/main" id="{14AA2F97-C180-483E-9001-6A094FDC2985}"/>
+              </a:ext>
+            </a:extLst>
+          </p:cNvPr>
+          <p:cNvSpPr>
+            <a:spLocks noGrp="1"/>
+          </p:cNvSpPr>
+          <p:nvPr>
+            <p:ph idx="1"/>
+          </p:nvPr>
+        </p:nvSpPr>
+        <p:spPr>
+          <a:xfrm>
+            <a:off x="838201" y="1793513"/>
+            <a:ext cx="10515598" cy="3838927"/>
+          </a:xfrm>
+        </p:spPr>
+        <p:txBody>
+          <a:bodyPr>
+            <a:normAutofit/>
+          </a:bodyPr>
+          <a:lstStyle/>
+          <a:p>
+            <a:r>
+              <a:rPr lang="en-US" sz="2000" dirty="0">
+                <a:solidFill>
+                  <a:srgbClr val="FFFFFF"/>
+                </a:solidFill>
+              </a:rPr>
+              <a:t>Bad to mediocre restaurants do not get enough business or are not well-known enough to make online reservation systems worth purchasing</a:t>
+            </a:r>
+          </a:p>
+          <a:p>
+            <a:r>
+              <a:rPr lang="en-US" sz="2000" dirty="0">
+                <a:solidFill>
+                  <a:srgbClr val="FFFFFF"/>
+                </a:solidFill>
+              </a:rPr>
+              <a:t>Reviews are curated and some portion of negative reviews are removed</a:t>
+            </a:r>
+          </a:p>
+          <a:p>
+            <a:pPr lvl="1"/>
+            <a:r>
+              <a:rPr lang="en-US" sz="1800" dirty="0">
+                <a:solidFill>
+                  <a:srgbClr val="FFFFFF"/>
+                </a:solidFill>
+              </a:rPr>
+              <a:t>All levels of OpenTable partnership plans offer ‘Ratings Management’</a:t>
+            </a:r>
+          </a:p>
+          <a:p>
+            <a:r>
+              <a:rPr lang="en-US" sz="2000" dirty="0">
+                <a:solidFill>
+                  <a:srgbClr val="FFFFFF"/>
+                </a:solidFill>
+              </a:rPr>
+              <a:t>Restaurants in New York City are just really, really good?</a:t>
+            </a:r>
+          </a:p>
+          <a:p>
+            <a:endParaRPr lang="en-US" sz="2000" dirty="0">
+              <a:solidFill>
+                <a:srgbClr val="FFFFFF"/>
+              </a:solidFill>
+            </a:endParaRPr>
+          </a:p>
+          <a:p>
+            <a:endParaRPr lang="en-US" sz="2000" dirty="0">
+              <a:solidFill>
+                <a:srgbClr val="FFFFFF"/>
+              </a:solidFill>
+            </a:endParaRPr>
+          </a:p>
+          <a:p>
+            <a:endParaRPr lang="en-US" sz="2000" dirty="0">
+              <a:solidFill>
+                <a:srgbClr val="FFFFFF"/>
+              </a:solidFill>
+            </a:endParaRPr>
+          </a:p>
+          <a:p>
+            <a:pPr marL="0" indent="0">
+              <a:buNone/>
+            </a:pPr>
             <a:r>
               <a:rPr lang="en-US" sz="2400" dirty="0">
                 <a:solidFill>
                   <a:srgbClr val="FFFFFF"/>
                 </a:solidFill>
               </a:rPr>
-              <a:t>Recommendations follow a nearly identical distribution to ratings</a:t>
-            </a:r>
-          </a:p>
-        </p:txBody>
-      </p:sp>
-      <p:pic>
-        <p:nvPicPr>
-          <p:cNvPr id="7" name="Picture 6">
-            <a:extLst>
-              <a:ext uri="{FF2B5EF4-FFF2-40B4-BE49-F238E27FC236}">
-                <a16:creationId xmlns:a16="http://schemas.microsoft.com/office/drawing/2014/main" id="{DB6AA4B0-339D-4E1E-9D00-481FE26FC18D}"/>
-              </a:ext>
-            </a:extLst>
-          </p:cNvPr>
-          <p:cNvPicPr>
-            <a:picLocks noChangeAspect="1"/>
-          </p:cNvPicPr>
-          <p:nvPr/>
-        </p:nvPicPr>
-        <p:blipFill>
-          <a:blip r:embed="rId2"/>
-          <a:stretch>
-            <a:fillRect/>
-          </a:stretch>
-        </p:blipFill>
-        <p:spPr>
-          <a:xfrm>
-            <a:off x="989785" y="365125"/>
-            <a:ext cx="10207135" cy="5234242"/>
-          </a:xfrm>
-          <a:prstGeom prst="rect">
-            <a:avLst/>
-          </a:prstGeom>
-        </p:spPr>
-      </p:pic>
+              <a:t>What factors are predictive of reservation numbers if not ratings?</a:t>
+            </a:r>
+          </a:p>
+        </p:txBody>
+      </p:sp>
     </p:spTree>
     <p:extLst>
       <p:ext uri="{BB962C8B-B14F-4D97-AF65-F5344CB8AC3E}">
-        <p14:creationId xmlns:p14="http://schemas.microsoft.com/office/powerpoint/2010/main" val="536897770"/>
+        <p14:creationId xmlns:p14="http://schemas.microsoft.com/office/powerpoint/2010/main" val="1508648685"/>
       </p:ext>
     </p:extLst>
   </p:cSld>
@@ -5901,10 +6055,10 @@
       </p:sp>
       <p:sp>
         <p:nvSpPr>
-          <p:cNvPr id="2" name="Title 1">
-            <a:extLst>
-              <a:ext uri="{FF2B5EF4-FFF2-40B4-BE49-F238E27FC236}">
-                <a16:creationId xmlns:a16="http://schemas.microsoft.com/office/drawing/2014/main" id="{F775F40A-BC61-453D-97EA-0314301A5978}"/>
+          <p:cNvPr id="3" name="Content Placeholder 2">
+            <a:extLst>
+              <a:ext uri="{FF2B5EF4-FFF2-40B4-BE49-F238E27FC236}">
+                <a16:creationId xmlns:a16="http://schemas.microsoft.com/office/drawing/2014/main" id="{14AA2F97-C180-483E-9001-6A094FDC2985}"/>
               </a:ext>
             </a:extLst>
           </p:cNvPr>
@@ -5912,129 +6066,76 @@
             <a:spLocks noGrp="1"/>
           </p:cNvSpPr>
           <p:nvPr>
-            <p:ph type="title"/>
+            <p:ph idx="1"/>
           </p:nvPr>
         </p:nvSpPr>
         <p:spPr>
           <a:xfrm>
-            <a:off x="833002" y="365125"/>
-            <a:ext cx="10520702" cy="1325563"/>
+            <a:off x="914401" y="5391150"/>
+            <a:ext cx="10515598" cy="1319615"/>
           </a:xfrm>
         </p:spPr>
         <p:txBody>
           <a:bodyPr>
-            <a:normAutofit/>
+            <a:normAutofit fontScale="92500"/>
           </a:bodyPr>
           <a:lstStyle/>
           <a:p>
-            <a:r>
-              <a:rPr lang="en-US" dirty="0">
-                <a:solidFill>
-                  <a:srgbClr val="FFFFFF"/>
-                </a:solidFill>
-              </a:rPr>
-              <a:t>Explanations:</a:t>
-            </a:r>
-          </a:p>
-        </p:txBody>
-      </p:sp>
-      <p:sp>
-        <p:nvSpPr>
-          <p:cNvPr id="3" name="Content Placeholder 2">
-            <a:extLst>
-              <a:ext uri="{FF2B5EF4-FFF2-40B4-BE49-F238E27FC236}">
-                <a16:creationId xmlns:a16="http://schemas.microsoft.com/office/drawing/2014/main" id="{14AA2F97-C180-483E-9001-6A094FDC2985}"/>
-              </a:ext>
-            </a:extLst>
-          </p:cNvPr>
-          <p:cNvSpPr>
-            <a:spLocks noGrp="1"/>
-          </p:cNvSpPr>
-          <p:nvPr>
-            <p:ph idx="1"/>
-          </p:nvPr>
-        </p:nvSpPr>
-        <p:spPr>
-          <a:xfrm>
-            <a:off x="838201" y="1506795"/>
-            <a:ext cx="10515598" cy="3838927"/>
-          </a:xfrm>
-        </p:spPr>
-        <p:txBody>
-          <a:bodyPr>
-            <a:normAutofit/>
-          </a:bodyPr>
-          <a:lstStyle/>
-          <a:p>
-            <a:r>
-              <a:rPr lang="en-US" sz="2000" dirty="0">
-                <a:solidFill>
-                  <a:srgbClr val="FFFFFF"/>
-                </a:solidFill>
-              </a:rPr>
-              <a:t>Bad to mediocre restaurants do not get enough business or are not well-known enough to make online reservation systems worth purchasing</a:t>
-            </a:r>
-          </a:p>
-          <a:p>
-            <a:r>
-              <a:rPr lang="en-US" sz="2000" dirty="0">
-                <a:solidFill>
-                  <a:srgbClr val="FFFFFF"/>
-                </a:solidFill>
-              </a:rPr>
-              <a:t>Reviews are curated and some portion of negative reviews are removed</a:t>
-            </a:r>
-          </a:p>
-          <a:p>
-            <a:r>
-              <a:rPr lang="en-US" sz="2000" dirty="0">
-                <a:solidFill>
-                  <a:srgbClr val="FFFFFF"/>
-                </a:solidFill>
-              </a:rPr>
-              <a:t>Restaurants in New York City are just really, really good?</a:t>
-            </a:r>
-          </a:p>
-          <a:p>
-            <a:endParaRPr lang="en-US" sz="2000" dirty="0">
-              <a:solidFill>
-                <a:srgbClr val="FFFFFF"/>
-              </a:solidFill>
-            </a:endParaRPr>
-          </a:p>
-          <a:p>
-            <a:endParaRPr lang="en-US" sz="2000" dirty="0">
-              <a:solidFill>
-                <a:srgbClr val="FFFFFF"/>
-              </a:solidFill>
-            </a:endParaRPr>
-          </a:p>
-          <a:p>
-            <a:endParaRPr lang="en-US" sz="2000" dirty="0">
-              <a:solidFill>
-                <a:srgbClr val="FFFFFF"/>
-              </a:solidFill>
-            </a:endParaRPr>
-          </a:p>
-          <a:p>
-            <a:pPr marL="0" indent="0">
-              <a:buNone/>
-            </a:pPr>
             <a:r>
               <a:rPr lang="en-US" sz="2400" dirty="0">
                 <a:solidFill>
                   <a:srgbClr val="FFFFFF"/>
                 </a:solidFill>
               </a:rPr>
-              <a:t>What factors are predictive of reservation numbers if not ratings?</a:t>
-            </a:r>
-          </a:p>
-        </p:txBody>
-      </p:sp>
+              <a:t>More expensive restaurants get more bookings, significant at p&lt;0.05 level in ANOVA</a:t>
+            </a:r>
+          </a:p>
+          <a:p>
+            <a:r>
+              <a:rPr lang="en-US" sz="2400" dirty="0">
+                <a:solidFill>
+                  <a:srgbClr val="FFFFFF"/>
+                </a:solidFill>
+              </a:rPr>
+              <a:t>Probable selection bias: cheaper/more casual restaurants tend to get more of their business from walk-ins and less from reservations</a:t>
+            </a:r>
+          </a:p>
+        </p:txBody>
+      </p:sp>
+      <p:pic>
+        <p:nvPicPr>
+          <p:cNvPr id="5" name="Picture 4">
+            <a:extLst>
+              <a:ext uri="{FF2B5EF4-FFF2-40B4-BE49-F238E27FC236}">
+                <a16:creationId xmlns:a16="http://schemas.microsoft.com/office/drawing/2014/main" id="{41EA90DF-569B-40F5-B456-7DC4E07C6EBF}"/>
+              </a:ext>
+            </a:extLst>
+          </p:cNvPr>
+          <p:cNvPicPr>
+            <a:picLocks noChangeAspect="1"/>
+          </p:cNvPicPr>
+          <p:nvPr/>
+        </p:nvPicPr>
+        <p:blipFill>
+          <a:blip r:embed="rId2"/>
+          <a:stretch>
+            <a:fillRect/>
+          </a:stretch>
+        </p:blipFill>
+        <p:spPr>
+          <a:xfrm>
+            <a:off x="1003242" y="70093"/>
+            <a:ext cx="10194290" cy="5146839"/>
+          </a:xfrm>
+          <a:prstGeom prst="rect">
+            <a:avLst/>
+          </a:prstGeom>
+        </p:spPr>
+      </p:pic>
     </p:spTree>
     <p:extLst>
       <p:ext uri="{BB962C8B-B14F-4D97-AF65-F5344CB8AC3E}">
-        <p14:creationId xmlns:p14="http://schemas.microsoft.com/office/powerpoint/2010/main" val="1508648685"/>
+        <p14:creationId xmlns:p14="http://schemas.microsoft.com/office/powerpoint/2010/main" val="3535209609"/>
       </p:ext>
     </p:extLst>
   </p:cSld>
@@ -6368,8 +6469,8 @@
         </p:nvSpPr>
         <p:spPr>
           <a:xfrm>
-            <a:off x="914401" y="5391151"/>
-            <a:ext cx="10515598" cy="1238250"/>
+            <a:off x="1110657" y="5295739"/>
+            <a:ext cx="9565440" cy="1224737"/>
           </a:xfrm>
         </p:spPr>
         <p:txBody>
@@ -6384,7 +6485,7 @@
                   <a:srgbClr val="FFFFFF"/>
                 </a:solidFill>
               </a:rPr>
-              <a:t>More expensive restaurants get more bookings, significant at 0.05 level</a:t>
+              <a:t>Promoted status on OpenTable results in higher numbers of bookings, significant at p&lt;0.05 level in 2-sample t test</a:t>
             </a:r>
           </a:p>
           <a:p>
@@ -6394,7 +6495,7 @@
                   <a:srgbClr val="FFFFFF"/>
                 </a:solidFill>
               </a:rPr>
-              <a:t>Probable selection bias: cheaper/more casual restaurants tend to get more of their business from walk-ins and less from reservations</a:t>
+              <a:t>More on this later</a:t>
             </a:r>
           </a:p>
         </p:txBody>
@@ -6404,7 +6505,7 @@
           <p:cNvPr id="5" name="Picture 4">
             <a:extLst>
               <a:ext uri="{FF2B5EF4-FFF2-40B4-BE49-F238E27FC236}">
-                <a16:creationId xmlns:a16="http://schemas.microsoft.com/office/drawing/2014/main" id="{41EA90DF-569B-40F5-B456-7DC4E07C6EBF}"/>
+                <a16:creationId xmlns:a16="http://schemas.microsoft.com/office/drawing/2014/main" id="{F4AD8D84-A3A5-4394-BC2C-3E821235B9DE}"/>
               </a:ext>
             </a:extLst>
           </p:cNvPr>
@@ -6421,8 +6522,8 @@
         </p:blipFill>
         <p:spPr>
           <a:xfrm>
-            <a:off x="1003242" y="70093"/>
-            <a:ext cx="10194290" cy="5146839"/>
+            <a:off x="1110657" y="213539"/>
+            <a:ext cx="9565440" cy="4792622"/>
           </a:xfrm>
           <a:prstGeom prst="rect">
             <a:avLst/>
@@ -6432,7 +6533,7 @@
     </p:spTree>
     <p:extLst>
       <p:ext uri="{BB962C8B-B14F-4D97-AF65-F5344CB8AC3E}">
-        <p14:creationId xmlns:p14="http://schemas.microsoft.com/office/powerpoint/2010/main" val="3535209609"/>
+        <p14:creationId xmlns:p14="http://schemas.microsoft.com/office/powerpoint/2010/main" val="3197845487"/>
       </p:ext>
     </p:extLst>
   </p:cSld>
@@ -6766,13 +6867,13 @@
         </p:nvSpPr>
         <p:spPr>
           <a:xfrm>
-            <a:off x="1110657" y="5419724"/>
-            <a:ext cx="9565440" cy="1152526"/>
+            <a:off x="838201" y="4305300"/>
+            <a:ext cx="10515598" cy="2181225"/>
           </a:xfrm>
         </p:spPr>
         <p:txBody>
           <a:bodyPr>
-            <a:normAutofit lnSpcReduction="10000"/>
+            <a:normAutofit/>
           </a:bodyPr>
           <a:lstStyle/>
           <a:p>
@@ -6782,7 +6883,7 @@
                   <a:srgbClr val="FFFFFF"/>
                 </a:solidFill>
               </a:rPr>
-              <a:t>Promoted status on OpenTable results in higher numbers of bookings, significant at 0.05 level</a:t>
+              <a:t>4 types of safety measures: distancing, PPE, sanitizing, and screening</a:t>
             </a:r>
           </a:p>
           <a:p>
@@ -6792,17 +6893,37 @@
                   <a:srgbClr val="FFFFFF"/>
                 </a:solidFill>
               </a:rPr>
-              <a:t>More on this later</a:t>
+              <a:t>Data was grouped by whether any of the 4 types were used</a:t>
+            </a:r>
+          </a:p>
+          <a:p>
+            <a:r>
+              <a:rPr lang="en-US" sz="2400" dirty="0">
+                <a:solidFill>
+                  <a:srgbClr val="FFFFFF"/>
+                </a:solidFill>
+              </a:rPr>
+              <a:t>Small difference may be because most consumers who are dining in-person again are either vaccinated or do not weigh the risk of COVID-19 very highly</a:t>
+            </a:r>
+          </a:p>
+          <a:p>
+            <a:r>
+              <a:rPr lang="en-US" sz="2400" dirty="0">
+                <a:solidFill>
+                  <a:srgbClr val="FFFFFF"/>
+                </a:solidFill>
+              </a:rPr>
+              <a:t>Significant at p&lt;0.05 level in 2-sample t test</a:t>
             </a:r>
           </a:p>
         </p:txBody>
       </p:sp>
       <p:pic>
         <p:nvPicPr>
-          <p:cNvPr id="5" name="Picture 4">
-            <a:extLst>
-              <a:ext uri="{FF2B5EF4-FFF2-40B4-BE49-F238E27FC236}">
-                <a16:creationId xmlns:a16="http://schemas.microsoft.com/office/drawing/2014/main" id="{F4AD8D84-A3A5-4394-BC2C-3E821235B9DE}"/>
+          <p:cNvPr id="7" name="Picture 6">
+            <a:extLst>
+              <a:ext uri="{FF2B5EF4-FFF2-40B4-BE49-F238E27FC236}">
+                <a16:creationId xmlns:a16="http://schemas.microsoft.com/office/drawing/2014/main" id="{408858E8-85F3-4138-ADCA-BD6B3C7DF727}"/>
               </a:ext>
             </a:extLst>
           </p:cNvPr>
@@ -6819,8 +6940,8 @@
         </p:blipFill>
         <p:spPr>
           <a:xfrm>
-            <a:off x="1110657" y="213539"/>
-            <a:ext cx="9565440" cy="4792622"/>
+            <a:off x="1966810" y="172409"/>
+            <a:ext cx="8258379" cy="3960482"/>
           </a:xfrm>
           <a:prstGeom prst="rect">
             <a:avLst/>
@@ -6830,7 +6951,7 @@
     </p:spTree>
     <p:extLst>
       <p:ext uri="{BB962C8B-B14F-4D97-AF65-F5344CB8AC3E}">
-        <p14:creationId xmlns:p14="http://schemas.microsoft.com/office/powerpoint/2010/main" val="3197845487"/>
+        <p14:creationId xmlns:p14="http://schemas.microsoft.com/office/powerpoint/2010/main" val="496945849"/>
       </p:ext>
     </p:extLst>
   </p:cSld>
@@ -7164,8 +7285,8 @@
         </p:nvSpPr>
         <p:spPr>
           <a:xfrm>
-            <a:off x="838201" y="4305300"/>
-            <a:ext cx="10515598" cy="2181225"/>
+            <a:off x="838201" y="4827513"/>
+            <a:ext cx="10515598" cy="1859037"/>
           </a:xfrm>
         </p:spPr>
         <p:txBody>
@@ -7175,52 +7296,69 @@
           <a:lstStyle/>
           <a:p>
             <a:r>
-              <a:rPr lang="en-US" sz="2400" dirty="0">
+              <a:rPr lang="en-US" sz="2000" dirty="0">
                 <a:solidFill>
                   <a:srgbClr val="FFFFFF"/>
                 </a:solidFill>
               </a:rPr>
-              <a:t>4 types of safety measures: distancing, PPE, sanitizing, and screening</a:t>
-            </a:r>
-          </a:p>
-          <a:p>
-            <a:r>
-              <a:rPr lang="en-US" sz="2400" dirty="0">
+              <a:t>Number of reviews per day was by far the best predictor of reservation numbers</a:t>
+            </a:r>
+          </a:p>
+          <a:p>
+            <a:pPr lvl="1"/>
+            <a:r>
+              <a:rPr lang="en-US" sz="1800" dirty="0">
                 <a:solidFill>
                   <a:srgbClr val="FFFFFF"/>
                 </a:solidFill>
               </a:rPr>
-              <a:t>Data was grouped by whether any of the 4 types were used</a:t>
-            </a:r>
-          </a:p>
-          <a:p>
-            <a:r>
-              <a:rPr lang="en-US" sz="2400" dirty="0">
+              <a:t>Linear model: Every review per day averages ~64 bookings per day</a:t>
+            </a:r>
+          </a:p>
+          <a:p>
+            <a:r>
+              <a:rPr lang="en-US" sz="2000" dirty="0">
                 <a:solidFill>
                   <a:srgbClr val="FFFFFF"/>
                 </a:solidFill>
               </a:rPr>
-              <a:t>Small difference may be because most consumers who are dining in-person again are either vaccinated or do not weigh the risk of COVID-19 very highly</a:t>
-            </a:r>
-          </a:p>
-          <a:p>
-            <a:r>
-              <a:rPr lang="en-US" sz="2400" dirty="0">
+              <a:t>Much of the variance in the dataset is still unaccounted for in this model (r</a:t>
+            </a:r>
+            <a:r>
+              <a:rPr lang="en-US" sz="2000" baseline="30000" dirty="0">
                 <a:solidFill>
                   <a:srgbClr val="FFFFFF"/>
                 </a:solidFill>
               </a:rPr>
-              <a:t>Significant at 0.05 level</a:t>
+              <a:t>2</a:t>
+            </a:r>
+            <a:r>
+              <a:rPr lang="en-US" sz="2000" dirty="0">
+                <a:solidFill>
+                  <a:srgbClr val="FFFFFF"/>
+                </a:solidFill>
+              </a:rPr>
+              <a:t> = 0.47, p = 1e-113)</a:t>
+            </a:r>
+          </a:p>
+          <a:p>
+            <a:r>
+              <a:rPr lang="en-US" sz="2000" dirty="0">
+                <a:solidFill>
+                  <a:srgbClr val="FFFFFF"/>
+                </a:solidFill>
+              </a:rPr>
+              <a:t>Ideally, data on the capacity of each restaurant could be integrated and analysis of reviews per seat per day might better control confounding factors and improve the model</a:t>
             </a:r>
           </a:p>
         </p:txBody>
       </p:sp>
       <p:pic>
         <p:nvPicPr>
-          <p:cNvPr id="7" name="Picture 6">
-            <a:extLst>
-              <a:ext uri="{FF2B5EF4-FFF2-40B4-BE49-F238E27FC236}">
-                <a16:creationId xmlns:a16="http://schemas.microsoft.com/office/drawing/2014/main" id="{408858E8-85F3-4138-ADCA-BD6B3C7DF727}"/>
+          <p:cNvPr id="11" name="Picture 10">
+            <a:extLst>
+              <a:ext uri="{FF2B5EF4-FFF2-40B4-BE49-F238E27FC236}">
+                <a16:creationId xmlns:a16="http://schemas.microsoft.com/office/drawing/2014/main" id="{C28CBEF2-B85E-4491-B416-B59F43F65224}"/>
               </a:ext>
             </a:extLst>
           </p:cNvPr>
@@ -7237,8 +7375,8 @@
         </p:blipFill>
         <p:spPr>
           <a:xfrm>
-            <a:off x="1966810" y="172409"/>
-            <a:ext cx="8258379" cy="3960482"/>
+            <a:off x="1951024" y="71150"/>
+            <a:ext cx="8289952" cy="4584913"/>
           </a:xfrm>
           <a:prstGeom prst="rect">
             <a:avLst/>
@@ -7248,7 +7386,7 @@
     </p:spTree>
     <p:extLst>
       <p:ext uri="{BB962C8B-B14F-4D97-AF65-F5344CB8AC3E}">
-        <p14:creationId xmlns:p14="http://schemas.microsoft.com/office/powerpoint/2010/main" val="496945849"/>
+        <p14:creationId xmlns:p14="http://schemas.microsoft.com/office/powerpoint/2010/main" val="762919823"/>
       </p:ext>
     </p:extLst>
   </p:cSld>
@@ -7582,8 +7720,8 @@
         </p:nvSpPr>
         <p:spPr>
           <a:xfrm>
-            <a:off x="838201" y="4827513"/>
-            <a:ext cx="10515598" cy="1859037"/>
+            <a:off x="838201" y="5314950"/>
+            <a:ext cx="10515598" cy="1197817"/>
           </a:xfrm>
         </p:spPr>
         <p:txBody>
@@ -7598,64 +7736,17 @@
                   <a:srgbClr val="FFFFFF"/>
                 </a:solidFill>
               </a:rPr>
-              <a:t>Number of reviews per day was by far the best predictor of reservation numbers</a:t>
-            </a:r>
-          </a:p>
-          <a:p>
-            <a:pPr lvl="1"/>
-            <a:r>
-              <a:rPr lang="en-US" sz="1800" dirty="0">
-                <a:solidFill>
-                  <a:srgbClr val="FFFFFF"/>
-                </a:solidFill>
-              </a:rPr>
-              <a:t>Linear model: Every review per day averages ~64 bookings per day</a:t>
-            </a:r>
-          </a:p>
-          <a:p>
-            <a:r>
-              <a:rPr lang="en-US" sz="2000" dirty="0">
-                <a:solidFill>
-                  <a:srgbClr val="FFFFFF"/>
-                </a:solidFill>
-              </a:rPr>
-              <a:t>Much of the variance in the dataset is still unaccounted for in this model (r</a:t>
-            </a:r>
-            <a:r>
-              <a:rPr lang="en-US" sz="2000" baseline="30000" dirty="0">
-                <a:solidFill>
-                  <a:srgbClr val="FFFFFF"/>
-                </a:solidFill>
-              </a:rPr>
-              <a:t>2</a:t>
-            </a:r>
-            <a:r>
-              <a:rPr lang="en-US" sz="2000" dirty="0">
-                <a:solidFill>
-                  <a:srgbClr val="FFFFFF"/>
-                </a:solidFill>
-              </a:rPr>
-              <a:t> = 0.47)</a:t>
-            </a:r>
-          </a:p>
-          <a:p>
-            <a:r>
-              <a:rPr lang="en-US" sz="2000" dirty="0">
-                <a:solidFill>
-                  <a:srgbClr val="FFFFFF"/>
-                </a:solidFill>
-              </a:rPr>
-              <a:t>Ideally, data on the capacity of each restaurant could be integrated and analysis of reviews per seat per day might reveal a clearer relationship</a:t>
+              <a:t>Promoted restaurants get almost twice as many bookings per review per day as non-promoted restaurants</a:t>
             </a:r>
           </a:p>
         </p:txBody>
       </p:sp>
       <p:pic>
         <p:nvPicPr>
-          <p:cNvPr id="11" name="Picture 10">
-            <a:extLst>
-              <a:ext uri="{FF2B5EF4-FFF2-40B4-BE49-F238E27FC236}">
-                <a16:creationId xmlns:a16="http://schemas.microsoft.com/office/drawing/2014/main" id="{C28CBEF2-B85E-4491-B416-B59F43F65224}"/>
+          <p:cNvPr id="5" name="Picture 4">
+            <a:extLst>
+              <a:ext uri="{FF2B5EF4-FFF2-40B4-BE49-F238E27FC236}">
+                <a16:creationId xmlns:a16="http://schemas.microsoft.com/office/drawing/2014/main" id="{74834684-BD90-4FC2-95D0-A34B728F9B0A}"/>
               </a:ext>
             </a:extLst>
           </p:cNvPr>
@@ -7672,8 +7763,8 @@
         </p:blipFill>
         <p:spPr>
           <a:xfrm>
-            <a:off x="1824041" y="51070"/>
-            <a:ext cx="8543918" cy="4725373"/>
+            <a:off x="1131094" y="91851"/>
+            <a:ext cx="9929812" cy="4988373"/>
           </a:xfrm>
           <a:prstGeom prst="rect">
             <a:avLst/>
@@ -7683,7 +7774,7 @@
     </p:spTree>
     <p:extLst>
       <p:ext uri="{BB962C8B-B14F-4D97-AF65-F5344CB8AC3E}">
-        <p14:creationId xmlns:p14="http://schemas.microsoft.com/office/powerpoint/2010/main" val="762919823"/>
+        <p14:creationId xmlns:p14="http://schemas.microsoft.com/office/powerpoint/2010/main" val="3765016197"/>
       </p:ext>
     </p:extLst>
   </p:cSld>
@@ -8017,8 +8108,8 @@
         </p:nvSpPr>
         <p:spPr>
           <a:xfrm>
-            <a:off x="838201" y="5314950"/>
-            <a:ext cx="10515598" cy="847725"/>
+            <a:off x="1206379" y="5362575"/>
+            <a:ext cx="10147420" cy="1143000"/>
           </a:xfrm>
         </p:spPr>
         <p:txBody>
@@ -8033,7 +8124,7 @@
                   <a:srgbClr val="FFFFFF"/>
                 </a:solidFill>
               </a:rPr>
-              <a:t>Promoted restaurants get almost twice as many bookings per review per day as non-promoted restaurants</a:t>
+              <a:t>Restaurants that offer outdoor dining receive about 65% more bookings per review per day than restaurants with indoor seating only</a:t>
             </a:r>
           </a:p>
         </p:txBody>
@@ -8043,7 +8134,7 @@
           <p:cNvPr id="5" name="Picture 4">
             <a:extLst>
               <a:ext uri="{FF2B5EF4-FFF2-40B4-BE49-F238E27FC236}">
-                <a16:creationId xmlns:a16="http://schemas.microsoft.com/office/drawing/2014/main" id="{74834684-BD90-4FC2-95D0-A34B728F9B0A}"/>
+                <a16:creationId xmlns:a16="http://schemas.microsoft.com/office/drawing/2014/main" id="{93BEC8AA-826E-4A1D-8E19-CF17D1D62FFA}"/>
               </a:ext>
             </a:extLst>
           </p:cNvPr>
@@ -8060,8 +8151,8 @@
         </p:blipFill>
         <p:spPr>
           <a:xfrm>
-            <a:off x="1131094" y="91851"/>
-            <a:ext cx="9929812" cy="4988373"/>
+            <a:off x="1206379" y="184639"/>
+            <a:ext cx="9779242" cy="5031397"/>
           </a:xfrm>
           <a:prstGeom prst="rect">
             <a:avLst/>
@@ -8071,7 +8162,7 @@
     </p:spTree>
     <p:extLst>
       <p:ext uri="{BB962C8B-B14F-4D97-AF65-F5344CB8AC3E}">
-        <p14:creationId xmlns:p14="http://schemas.microsoft.com/office/powerpoint/2010/main" val="3765016197"/>
+        <p14:creationId xmlns:p14="http://schemas.microsoft.com/office/powerpoint/2010/main" val="2534755881"/>
       </p:ext>
     </p:extLst>
   </p:cSld>
@@ -8476,14 +8567,10 @@
                   <a:srgbClr val="FFFFFF"/>
                 </a:solidFill>
               </a:rPr>
-              <a:t>Estimated $240 billion in losses due to the COVID-19 pandemic (National Restaurant Association, 2021)</a:t>
-            </a:r>
-          </a:p>
-          <a:p>
-            <a:r>
-              <a:rPr lang="en-US" sz="2000" dirty="0"/>
-              <a:t>100,000+ businesses in the industry closed, either temporarily or permanently (National Restaurant Association, 2021)</a:t>
-            </a:r>
+              <a:t>Estimated $240 billion in losses due to COVID-19 pandemic</a:t>
+            </a:r>
+          </a:p>
+          <a:p>
             <a:endParaRPr lang="en-US" sz="2000" dirty="0">
               <a:solidFill>
                 <a:srgbClr val="FFFFFF"/>
@@ -8492,11 +8579,32 @@
           </a:p>
           <a:p>
             <a:r>
-              <a:rPr lang="en-US" sz="2000" b="0" i="0" dirty="0">
-                <a:effectLst/>
-              </a:rPr>
-              <a:t>66% year-on-year decline in consumers dining in restaurants in 2020 (Statista, 2021)</a:t>
-            </a:r>
+              <a:rPr lang="en-US" sz="2000" dirty="0"/>
+              <a:t>100,000+ businesses in the industry closed, either temporarily or permanently</a:t>
+            </a:r>
+          </a:p>
+          <a:p>
+            <a:endParaRPr lang="en-US" sz="2000" dirty="0"/>
+          </a:p>
+          <a:p>
+            <a:pPr marL="0" indent="0">
+              <a:buNone/>
+            </a:pPr>
+            <a:endParaRPr lang="en-US" sz="2000" dirty="0"/>
+          </a:p>
+          <a:p>
+            <a:pPr marL="0" indent="0">
+              <a:buNone/>
+            </a:pPr>
+            <a:r>
+              <a:rPr lang="en-US" sz="1600" dirty="0"/>
+              <a:t>National Restaurant Association, 2021</a:t>
+            </a:r>
+            <a:endParaRPr lang="en-US" sz="1600" dirty="0">
+              <a:solidFill>
+                <a:srgbClr val="FFFFFF"/>
+              </a:solidFill>
+            </a:endParaRPr>
           </a:p>
           <a:p>
             <a:endParaRPr lang="en-US" sz="2000" dirty="0">
@@ -8873,10 +8981,10 @@
       </p:sp>
       <p:sp>
         <p:nvSpPr>
-          <p:cNvPr id="3" name="Content Placeholder 2">
-            <a:extLst>
-              <a:ext uri="{FF2B5EF4-FFF2-40B4-BE49-F238E27FC236}">
-                <a16:creationId xmlns:a16="http://schemas.microsoft.com/office/drawing/2014/main" id="{14AA2F97-C180-483E-9001-6A094FDC2985}"/>
+          <p:cNvPr id="5" name="Content Placeholder 4">
+            <a:extLst>
+              <a:ext uri="{FF2B5EF4-FFF2-40B4-BE49-F238E27FC236}">
+                <a16:creationId xmlns:a16="http://schemas.microsoft.com/office/drawing/2014/main" id="{FD683FA5-E664-4D40-B91E-8D87AB3F2549}"/>
               </a:ext>
             </a:extLst>
           </p:cNvPr>
@@ -8889,33 +8997,54 @@
         </p:nvSpPr>
         <p:spPr>
           <a:xfrm>
-            <a:off x="1206379" y="5362575"/>
-            <a:ext cx="10147420" cy="1143000"/>
-          </a:xfrm>
-        </p:spPr>
-        <p:txBody>
-          <a:bodyPr>
-            <a:normAutofit/>
-          </a:bodyPr>
-          <a:lstStyle/>
-          <a:p>
-            <a:r>
-              <a:rPr lang="en-US" sz="2000" dirty="0">
-                <a:solidFill>
-                  <a:srgbClr val="FFFFFF"/>
-                </a:solidFill>
-              </a:rPr>
-              <a:t>Restaurants that offered outdoor dining received about 65% more bookings per review per day than restaurants with indoor seating only</a:t>
-            </a:r>
+            <a:off x="6083054" y="774441"/>
+            <a:ext cx="5270746" cy="5402522"/>
+          </a:xfrm>
+        </p:spPr>
+        <p:txBody>
+          <a:bodyPr/>
+          <a:lstStyle/>
+          <a:p>
+            <a:r>
+              <a:rPr lang="en-US" dirty="0"/>
+              <a:t>Multiple regression model only marginally better than linear regression on reviews/day</a:t>
+            </a:r>
+            <a:endParaRPr lang="en-US" sz="2800" dirty="0">
+              <a:solidFill>
+                <a:srgbClr val="FFFFFF"/>
+              </a:solidFill>
+            </a:endParaRPr>
+          </a:p>
+          <a:p>
+            <a:endParaRPr lang="en-US" dirty="0"/>
+          </a:p>
+          <a:p>
+            <a:r>
+              <a:rPr lang="en-US" dirty="0"/>
+              <a:t>52% of variance in data explained by these factors</a:t>
+            </a:r>
+          </a:p>
+          <a:p>
+            <a:endParaRPr lang="en-US" dirty="0"/>
+          </a:p>
+          <a:p>
+            <a:r>
+              <a:rPr lang="en-US" dirty="0"/>
+              <a:t>Important factors still unaccounted for by this analysis</a:t>
+            </a:r>
+          </a:p>
+          <a:p>
+            <a:pPr lvl="1"/>
+            <a:endParaRPr lang="en-US" dirty="0"/>
           </a:p>
         </p:txBody>
       </p:sp>
       <p:pic>
         <p:nvPicPr>
-          <p:cNvPr id="5" name="Picture 4">
-            <a:extLst>
-              <a:ext uri="{FF2B5EF4-FFF2-40B4-BE49-F238E27FC236}">
-                <a16:creationId xmlns:a16="http://schemas.microsoft.com/office/drawing/2014/main" id="{93BEC8AA-826E-4A1D-8E19-CF17D1D62FFA}"/>
+          <p:cNvPr id="11" name="Picture 10">
+            <a:extLst>
+              <a:ext uri="{FF2B5EF4-FFF2-40B4-BE49-F238E27FC236}">
+                <a16:creationId xmlns:a16="http://schemas.microsoft.com/office/drawing/2014/main" id="{C0C07A05-8B4A-4263-A823-0B0FB7088A8E}"/>
               </a:ext>
             </a:extLst>
           </p:cNvPr>
@@ -8932,18 +9061,122 @@
         </p:blipFill>
         <p:spPr>
           <a:xfrm>
-            <a:off x="1206379" y="184639"/>
-            <a:ext cx="9779242" cy="5031397"/>
+            <a:off x="257745" y="195944"/>
+            <a:ext cx="5270746" cy="6410131"/>
           </a:xfrm>
           <a:prstGeom prst="rect">
             <a:avLst/>
           </a:prstGeom>
         </p:spPr>
       </p:pic>
+      <p:sp>
+        <p:nvSpPr>
+          <p:cNvPr id="13" name="Oval 12">
+            <a:extLst>
+              <a:ext uri="{FF2B5EF4-FFF2-40B4-BE49-F238E27FC236}">
+                <a16:creationId xmlns:a16="http://schemas.microsoft.com/office/drawing/2014/main" id="{7F054727-65CA-4766-AE7F-17D7F46F8756}"/>
+              </a:ext>
+            </a:extLst>
+          </p:cNvPr>
+          <p:cNvSpPr/>
+          <p:nvPr/>
+        </p:nvSpPr>
+        <p:spPr>
+          <a:xfrm>
+            <a:off x="3048259" y="214606"/>
+            <a:ext cx="1738341" cy="309966"/>
+          </a:xfrm>
+          <a:prstGeom prst="ellipse">
+            <a:avLst/>
+          </a:prstGeom>
+          <a:noFill/>
+          <a:ln w="25400">
+            <a:solidFill>
+              <a:srgbClr val="FF0000"/>
+            </a:solidFill>
+          </a:ln>
+        </p:spPr>
+        <p:style>
+          <a:lnRef idx="2">
+            <a:schemeClr val="accent1">
+              <a:shade val="50000"/>
+            </a:schemeClr>
+          </a:lnRef>
+          <a:fillRef idx="1">
+            <a:schemeClr val="accent1"/>
+          </a:fillRef>
+          <a:effectRef idx="0">
+            <a:schemeClr val="accent1"/>
+          </a:effectRef>
+          <a:fontRef idx="minor">
+            <a:schemeClr val="lt1"/>
+          </a:fontRef>
+        </p:style>
+        <p:txBody>
+          <a:bodyPr rtlCol="0" anchor="ctr"/>
+          <a:lstStyle/>
+          <a:p>
+            <a:pPr algn="ctr"/>
+            <a:endParaRPr lang="en-US"/>
+          </a:p>
+        </p:txBody>
+      </p:sp>
+      <p:sp>
+        <p:nvSpPr>
+          <p:cNvPr id="14" name="Oval 13">
+            <a:extLst>
+              <a:ext uri="{FF2B5EF4-FFF2-40B4-BE49-F238E27FC236}">
+                <a16:creationId xmlns:a16="http://schemas.microsoft.com/office/drawing/2014/main" id="{3795D218-F7CF-410E-95A8-B6962B3041D2}"/>
+              </a:ext>
+            </a:extLst>
+          </p:cNvPr>
+          <p:cNvSpPr/>
+          <p:nvPr/>
+        </p:nvSpPr>
+        <p:spPr>
+          <a:xfrm>
+            <a:off x="2687215" y="1057473"/>
+            <a:ext cx="2071392" cy="309966"/>
+          </a:xfrm>
+          <a:prstGeom prst="ellipse">
+            <a:avLst/>
+          </a:prstGeom>
+          <a:noFill/>
+          <a:ln w="25400">
+            <a:solidFill>
+              <a:srgbClr val="FF0000"/>
+            </a:solidFill>
+          </a:ln>
+        </p:spPr>
+        <p:style>
+          <a:lnRef idx="2">
+            <a:schemeClr val="accent1">
+              <a:shade val="50000"/>
+            </a:schemeClr>
+          </a:lnRef>
+          <a:fillRef idx="1">
+            <a:schemeClr val="accent1"/>
+          </a:fillRef>
+          <a:effectRef idx="0">
+            <a:schemeClr val="accent1"/>
+          </a:effectRef>
+          <a:fontRef idx="minor">
+            <a:schemeClr val="lt1"/>
+          </a:fontRef>
+        </p:style>
+        <p:txBody>
+          <a:bodyPr rtlCol="0" anchor="ctr"/>
+          <a:lstStyle/>
+          <a:p>
+            <a:pPr algn="ctr"/>
+            <a:endParaRPr lang="en-US"/>
+          </a:p>
+        </p:txBody>
+      </p:sp>
     </p:spTree>
     <p:extLst>
       <p:ext uri="{BB962C8B-B14F-4D97-AF65-F5344CB8AC3E}">
-        <p14:creationId xmlns:p14="http://schemas.microsoft.com/office/powerpoint/2010/main" val="2534755881"/>
+        <p14:creationId xmlns:p14="http://schemas.microsoft.com/office/powerpoint/2010/main" val="1948058984"/>
       </p:ext>
     </p:extLst>
   </p:cSld>
@@ -9317,7 +9550,7 @@
         <p:spPr>
           <a:xfrm>
             <a:off x="857251" y="1754445"/>
-            <a:ext cx="10515598" cy="3838927"/>
+            <a:ext cx="10515598" cy="4072918"/>
           </a:xfrm>
         </p:spPr>
         <p:txBody>
@@ -9332,8 +9565,13 @@
                   <a:srgbClr val="FFFFFF"/>
                 </a:solidFill>
               </a:rPr>
-              <a:t>Be specific about describing the food and experiences offered, especially if you offer less-known regional or specialized cuisine</a:t>
-            </a:r>
+              <a:t>Be specific about labeling the food and experiences offered, especially if you serve less-known regional or specialized cuisine</a:t>
+            </a:r>
+            <a:endParaRPr lang="en-US" sz="2000" dirty="0">
+              <a:solidFill>
+                <a:srgbClr val="FFFFFF"/>
+              </a:solidFill>
+            </a:endParaRPr>
           </a:p>
           <a:p>
             <a:r>
@@ -9342,8 +9580,13 @@
                   <a:srgbClr val="FFFFFF"/>
                 </a:solidFill>
               </a:rPr>
-              <a:t>The rate at which customers make reviews, not the quality of those reviews, is the best predictor of bookings</a:t>
-            </a:r>
+              <a:t>The rate at which customers make reviews, not the quality of those reviews, is the best predictor of bookings </a:t>
+            </a:r>
+            <a:endParaRPr lang="en-US" sz="2000" dirty="0">
+              <a:solidFill>
+                <a:srgbClr val="FFFFFF"/>
+              </a:solidFill>
+            </a:endParaRPr>
           </a:p>
           <a:p>
             <a:r>
@@ -9352,18 +9595,18 @@
                   <a:srgbClr val="FFFFFF"/>
                 </a:solidFill>
               </a:rPr>
-              <a:t>Promoted status increases bookings by almost 100%</a:t>
+              <a:t>Promoted status increases bookings per review per day by almost 100%</a:t>
             </a:r>
           </a:p>
           <a:p>
             <a:pPr lvl="1"/>
             <a:r>
-              <a:rPr lang="en-US" dirty="0">
+              <a:rPr lang="en-US" sz="2000" dirty="0">
                 <a:solidFill>
                   <a:srgbClr val="FFFFFF"/>
                 </a:solidFill>
               </a:rPr>
-              <a:t>Profitability of promoted status depends on your profit per booking vs the cost of being promoted</a:t>
+              <a:t>Profitability of promoted status depends on your profit per booking vs the cost of buying promoted status</a:t>
             </a:r>
           </a:p>
           <a:p>
@@ -9839,7 +10082,7 @@
                   <a:srgbClr val="FFFFFF"/>
                 </a:solidFill>
               </a:rPr>
-              <a:t>Comparison of OpenTable to other online reservation services</a:t>
+              <a:t>Causality</a:t>
             </a:r>
           </a:p>
           <a:p>
@@ -9850,7 +10093,7 @@
                   <a:srgbClr val="FFFFFF"/>
                 </a:solidFill>
               </a:rPr>
-              <a:t>Yelp, Eat App, Table Agent</a:t>
+              <a:t>Controlling for physical size of restaurant and the effect that has on diners/day and by proxy reviews/day</a:t>
             </a:r>
           </a:p>
           <a:p>
@@ -9871,18 +10114,7 @@
                   <a:srgbClr val="FFFFFF"/>
                 </a:solidFill>
               </a:rPr>
-              <a:t>Should restaurant entrepreneurs aim for certain neighborhoods?</a:t>
-            </a:r>
-          </a:p>
-          <a:p>
-            <a:pPr lvl="1"/>
-            <a:r>
-              <a:rPr lang="en-US" sz="2000" dirty="0">
-                <a:solidFill>
-                  <a:srgbClr val="FFFFFF"/>
-                </a:solidFill>
-              </a:rPr>
-              <a:t>Rent prices vs increased business tradeoff by location</a:t>
+              <a:t>Rent prices vs increased bookings tradeoffs by neighborhood/zip code</a:t>
             </a:r>
           </a:p>
         </p:txBody>
@@ -10316,6 +10548,11 @@
               </a:rPr>
               <a:t>Websites and online reviews and are the second-largest source of new customers at 35%, behind only recommendations from friends and family at 49% (Toast, 2020)</a:t>
             </a:r>
+          </a:p>
+          <a:p>
+            <a:pPr marL="457200" lvl="1" indent="0">
+              <a:buNone/>
+            </a:pPr>
             <a:endParaRPr lang="en-US" sz="2000" dirty="0">
               <a:solidFill>
                 <a:srgbClr val="FFFFFF"/>
@@ -10340,6 +10577,11 @@
               </a:rPr>
               <a:t>In April 2020, 83% of adults said they were not eating on-premise at restaurants as often as they’d like, up from 45% in January 2020 (National Restaurant Association, 2021)</a:t>
             </a:r>
+          </a:p>
+          <a:p>
+            <a:pPr marL="457200" lvl="1" indent="0">
+              <a:buNone/>
+            </a:pPr>
             <a:endParaRPr lang="en-US" sz="2000" b="0" i="0" dirty="0">
               <a:solidFill>
                 <a:srgbClr val="FFFFFF"/>
@@ -10750,8 +10992,8 @@
         </p:nvSpPr>
         <p:spPr>
           <a:xfrm>
-            <a:off x="838201" y="3037987"/>
-            <a:ext cx="10515598" cy="3138975"/>
+            <a:off x="838201" y="2936929"/>
+            <a:ext cx="10515598" cy="3563761"/>
           </a:xfrm>
         </p:spPr>
         <p:txBody>
@@ -10766,10 +11008,23 @@
                   <a:srgbClr val="FFFFFF"/>
                 </a:solidFill>
               </a:rPr>
-              <a:t>Scraped data from every restaurant in New York City currently active on OpenTable</a:t>
-            </a:r>
-          </a:p>
-          <a:p>
+              <a:t>Scraped information about every restaurant in New York City currently active on OpenTable: ~1100 restaurants with 25 features</a:t>
+            </a:r>
+          </a:p>
+          <a:p>
+            <a:r>
+              <a:rPr lang="en-US" sz="2400" dirty="0">
+                <a:solidFill>
+                  <a:srgbClr val="FFFFFF"/>
+                </a:solidFill>
+              </a:rPr>
+              <a:t>Scraped number of bookings at each restaurant in NYC over the past week</a:t>
+            </a:r>
+          </a:p>
+          <a:p>
+            <a:pPr marL="0" indent="0">
+              <a:buNone/>
+            </a:pPr>
             <a:endParaRPr lang="en-US" sz="2400" dirty="0">
               <a:solidFill>
                 <a:srgbClr val="FFFFFF"/>
@@ -10783,7 +11038,7 @@
                   <a:srgbClr val="FFFFFF"/>
                 </a:solidFill>
               </a:rPr>
-              <a:t>Examined 3 major groups of factors:</a:t>
+              <a:t>Analysis focused on 3 major groups of factors:</a:t>
             </a:r>
           </a:p>
           <a:p>
@@ -10805,7 +11060,7 @@
                   <a:srgbClr val="FFFFFF"/>
                 </a:solidFill>
               </a:rPr>
-              <a:t>User reviews</a:t>
+              <a:t>User reviews and promoted status</a:t>
             </a:r>
           </a:p>
           <a:p>
@@ -11174,7 +11429,7 @@
                   <a:srgbClr val="FFFFFF"/>
                 </a:solidFill>
               </a:rPr>
-              <a:t>New enrollment on OpenTable in 2019 and 2020 was stagnant at best</a:t>
+              <a:t>New enrollment on OpenTable in 2019 and 2020 in NYC was stagnant at best</a:t>
             </a:r>
           </a:p>
           <a:p>
@@ -11959,7 +12214,7 @@
           <p:cNvPr id="5" name="Picture 4">
             <a:extLst>
               <a:ext uri="{FF2B5EF4-FFF2-40B4-BE49-F238E27FC236}">
-                <a16:creationId xmlns:a16="http://schemas.microsoft.com/office/drawing/2014/main" id="{F9F863B1-34A5-4CA0-923C-6173B3FF27F7}"/>
+                <a16:creationId xmlns:a16="http://schemas.microsoft.com/office/drawing/2014/main" id="{C91203F4-E6CE-4A2C-B2B5-BE7CC95CB804}"/>
               </a:ext>
             </a:extLst>
           </p:cNvPr>
@@ -11968,25 +12223,85 @@
           </p:cNvPicPr>
           <p:nvPr/>
         </p:nvPicPr>
-        <p:blipFill rotWithShape="1">
+        <p:blipFill>
           <a:blip r:embed="rId2"/>
-          <a:srcRect l="1495"/>
-          <a:stretch/>
+          <a:stretch>
+            <a:fillRect/>
+          </a:stretch>
         </p:blipFill>
         <p:spPr>
           <a:xfrm>
-            <a:off x="1441938" y="696867"/>
-            <a:ext cx="9308123" cy="5034032"/>
+            <a:off x="1332234" y="103448"/>
+            <a:ext cx="9527531" cy="5223902"/>
           </a:xfrm>
           <a:prstGeom prst="rect">
             <a:avLst/>
           </a:prstGeom>
         </p:spPr>
       </p:pic>
+      <p:sp>
+        <p:nvSpPr>
+          <p:cNvPr id="11" name="Content Placeholder 2">
+            <a:extLst>
+              <a:ext uri="{FF2B5EF4-FFF2-40B4-BE49-F238E27FC236}">
+                <a16:creationId xmlns:a16="http://schemas.microsoft.com/office/drawing/2014/main" id="{10FA521F-A87E-4E1E-9E7C-A969A257EB86}"/>
+              </a:ext>
+            </a:extLst>
+          </p:cNvPr>
+          <p:cNvSpPr>
+            <a:spLocks noGrp="1"/>
+          </p:cNvSpPr>
+          <p:nvPr>
+            <p:ph idx="1"/>
+          </p:nvPr>
+        </p:nvSpPr>
+        <p:spPr>
+          <a:xfrm>
+            <a:off x="1520864" y="5385054"/>
+            <a:ext cx="9452997" cy="1369498"/>
+          </a:xfrm>
+        </p:spPr>
+        <p:txBody>
+          <a:bodyPr>
+            <a:normAutofit/>
+          </a:bodyPr>
+          <a:lstStyle/>
+          <a:p>
+            <a:r>
+              <a:rPr lang="en-US" sz="2400" dirty="0">
+                <a:solidFill>
+                  <a:srgbClr val="FFFFFF"/>
+                </a:solidFill>
+              </a:rPr>
+              <a:t>OpenTable allows 4 cuisine tags, less than 5% of restaurants use all 4</a:t>
+            </a:r>
+          </a:p>
+          <a:p>
+            <a:r>
+              <a:rPr lang="en-US" sz="2400" dirty="0">
+                <a:solidFill>
+                  <a:srgbClr val="FFFFFF"/>
+                </a:solidFill>
+              </a:rPr>
+              <a:t>Be specific when labeling cuisine! </a:t>
+            </a:r>
+          </a:p>
+          <a:p>
+            <a:r>
+              <a:rPr lang="en-US" sz="2400" dirty="0">
+                <a:solidFill>
+                  <a:srgbClr val="FFFFFF"/>
+                </a:solidFill>
+              </a:rPr>
+              <a:t>Being a bigger fish in a smaller pond can be a good thing</a:t>
+            </a:r>
+          </a:p>
+        </p:txBody>
+      </p:sp>
     </p:spTree>
     <p:extLst>
       <p:ext uri="{BB962C8B-B14F-4D97-AF65-F5344CB8AC3E}">
-        <p14:creationId xmlns:p14="http://schemas.microsoft.com/office/powerpoint/2010/main" val="490145044"/>
+        <p14:creationId xmlns:p14="http://schemas.microsoft.com/office/powerpoint/2010/main" val="550185066"/>
       </p:ext>
     </p:extLst>
   </p:cSld>
@@ -12304,10 +12619,10 @@
       </p:sp>
       <p:pic>
         <p:nvPicPr>
-          <p:cNvPr id="5" name="Picture 4">
-            <a:extLst>
-              <a:ext uri="{FF2B5EF4-FFF2-40B4-BE49-F238E27FC236}">
-                <a16:creationId xmlns:a16="http://schemas.microsoft.com/office/drawing/2014/main" id="{C91203F4-E6CE-4A2C-B2B5-BE7CC95CB804}"/>
+          <p:cNvPr id="3" name="Picture 2">
+            <a:extLst>
+              <a:ext uri="{FF2B5EF4-FFF2-40B4-BE49-F238E27FC236}">
+                <a16:creationId xmlns:a16="http://schemas.microsoft.com/office/drawing/2014/main" id="{18334AE3-7A23-49E5-8F84-AEA5BD192CBD}"/>
               </a:ext>
             </a:extLst>
           </p:cNvPr>
@@ -12324,8 +12639,8 @@
         </p:blipFill>
         <p:spPr>
           <a:xfrm>
-            <a:off x="1332234" y="312674"/>
-            <a:ext cx="9527531" cy="5223902"/>
+            <a:off x="1513166" y="139486"/>
+            <a:ext cx="9165667" cy="5026859"/>
           </a:xfrm>
           <a:prstGeom prst="rect">
             <a:avLst/>
@@ -12334,10 +12649,10 @@
       </p:pic>
       <p:sp>
         <p:nvSpPr>
-          <p:cNvPr id="11" name="Content Placeholder 2">
-            <a:extLst>
-              <a:ext uri="{FF2B5EF4-FFF2-40B4-BE49-F238E27FC236}">
-                <a16:creationId xmlns:a16="http://schemas.microsoft.com/office/drawing/2014/main" id="{10FA521F-A87E-4E1E-9E7C-A969A257EB86}"/>
+          <p:cNvPr id="9" name="Content Placeholder 2">
+            <a:extLst>
+              <a:ext uri="{FF2B5EF4-FFF2-40B4-BE49-F238E27FC236}">
+                <a16:creationId xmlns:a16="http://schemas.microsoft.com/office/drawing/2014/main" id="{BB9E5A98-F9D6-445B-901D-5BB821F3A500}"/>
               </a:ext>
             </a:extLst>
           </p:cNvPr>
@@ -12350,8 +12665,8 @@
         </p:nvSpPr>
         <p:spPr>
           <a:xfrm>
-            <a:off x="1332234" y="5705475"/>
-            <a:ext cx="9452997" cy="1066800"/>
+            <a:off x="898902" y="5362414"/>
+            <a:ext cx="10500101" cy="1263112"/>
           </a:xfrm>
         </p:spPr>
         <p:txBody>
@@ -12366,17 +12681,7 @@
                   <a:srgbClr val="FFFFFF"/>
                 </a:solidFill>
               </a:rPr>
-              <a:t>Be specific when labeling cuisine! </a:t>
-            </a:r>
-          </a:p>
-          <a:p>
-            <a:r>
-              <a:rPr lang="en-US" sz="2400" dirty="0">
-                <a:solidFill>
-                  <a:srgbClr val="FFFFFF"/>
-                </a:solidFill>
-              </a:rPr>
-              <a:t>Being a bigger fish in a smaller pond can be a good thing</a:t>
+              <a:t>Cuisine popularity for a specific restaurant was proxied using the geometric mean of bookings/day for all tagged cuisine styles for each restaurant</a:t>
             </a:r>
           </a:p>
         </p:txBody>
@@ -12384,7 +12689,7 @@
     </p:spTree>
     <p:extLst>
       <p:ext uri="{BB962C8B-B14F-4D97-AF65-F5344CB8AC3E}">
-        <p14:creationId xmlns:p14="http://schemas.microsoft.com/office/powerpoint/2010/main" val="550185066"/>
+        <p14:creationId xmlns:p14="http://schemas.microsoft.com/office/powerpoint/2010/main" val="490145044"/>
       </p:ext>
     </p:extLst>
   </p:cSld>
@@ -12735,7 +13040,7 @@
                   <a:srgbClr val="FFFFFF"/>
                 </a:solidFill>
               </a:rPr>
-              <a:t>Customers value factors aside from food alone!</a:t>
+              <a:t>Customers value factors aside from food alone</a:t>
             </a:r>
           </a:p>
         </p:txBody>

</xml_diff>